<commit_message>
Add redis cache to session 2.
</commit_message>
<xml_diff>
--- a/setup/AzureX.pptx
+++ b/setup/AzureX.pptx
@@ -242,7 +242,7 @@
           <a:p>
             <a:fld id="{4215C990-A328-409D-95CF-76DFE9640D99}" type="datetimeFigureOut">
               <a:rPr lang="en-US" smtClean="0"/>
-              <a:t>2/22/2017</a:t>
+              <a:t>2/23/2017</a:t>
             </a:fld>
             <a:endParaRPr lang="en-US"/>
           </a:p>
@@ -410,7 +410,7 @@
           <a:p>
             <a:fld id="{4215C990-A328-409D-95CF-76DFE9640D99}" type="datetimeFigureOut">
               <a:rPr lang="en-US" smtClean="0"/>
-              <a:t>2/22/2017</a:t>
+              <a:t>2/23/2017</a:t>
             </a:fld>
             <a:endParaRPr lang="en-US"/>
           </a:p>
@@ -588,7 +588,7 @@
           <a:p>
             <a:fld id="{4215C990-A328-409D-95CF-76DFE9640D99}" type="datetimeFigureOut">
               <a:rPr lang="en-US" smtClean="0"/>
-              <a:t>2/22/2017</a:t>
+              <a:t>2/23/2017</a:t>
             </a:fld>
             <a:endParaRPr lang="en-US"/>
           </a:p>
@@ -756,7 +756,7 @@
           <a:p>
             <a:fld id="{4215C990-A328-409D-95CF-76DFE9640D99}" type="datetimeFigureOut">
               <a:rPr lang="en-US" smtClean="0"/>
-              <a:t>2/22/2017</a:t>
+              <a:t>2/23/2017</a:t>
             </a:fld>
             <a:endParaRPr lang="en-US"/>
           </a:p>
@@ -1001,7 +1001,7 @@
           <a:p>
             <a:fld id="{4215C990-A328-409D-95CF-76DFE9640D99}" type="datetimeFigureOut">
               <a:rPr lang="en-US" smtClean="0"/>
-              <a:t>2/22/2017</a:t>
+              <a:t>2/23/2017</a:t>
             </a:fld>
             <a:endParaRPr lang="en-US"/>
           </a:p>
@@ -1230,7 +1230,7 @@
           <a:p>
             <a:fld id="{4215C990-A328-409D-95CF-76DFE9640D99}" type="datetimeFigureOut">
               <a:rPr lang="en-US" smtClean="0"/>
-              <a:t>2/22/2017</a:t>
+              <a:t>2/23/2017</a:t>
             </a:fld>
             <a:endParaRPr lang="en-US"/>
           </a:p>
@@ -1594,7 +1594,7 @@
           <a:p>
             <a:fld id="{4215C990-A328-409D-95CF-76DFE9640D99}" type="datetimeFigureOut">
               <a:rPr lang="en-US" smtClean="0"/>
-              <a:t>2/22/2017</a:t>
+              <a:t>2/23/2017</a:t>
             </a:fld>
             <a:endParaRPr lang="en-US"/>
           </a:p>
@@ -1711,7 +1711,7 @@
           <a:p>
             <a:fld id="{4215C990-A328-409D-95CF-76DFE9640D99}" type="datetimeFigureOut">
               <a:rPr lang="en-US" smtClean="0"/>
-              <a:t>2/22/2017</a:t>
+              <a:t>2/23/2017</a:t>
             </a:fld>
             <a:endParaRPr lang="en-US"/>
           </a:p>
@@ -1806,7 +1806,7 @@
           <a:p>
             <a:fld id="{4215C990-A328-409D-95CF-76DFE9640D99}" type="datetimeFigureOut">
               <a:rPr lang="en-US" smtClean="0"/>
-              <a:t>2/22/2017</a:t>
+              <a:t>2/23/2017</a:t>
             </a:fld>
             <a:endParaRPr lang="en-US"/>
           </a:p>
@@ -2081,7 +2081,7 @@
           <a:p>
             <a:fld id="{4215C990-A328-409D-95CF-76DFE9640D99}" type="datetimeFigureOut">
               <a:rPr lang="en-US" smtClean="0"/>
-              <a:t>2/22/2017</a:t>
+              <a:t>2/23/2017</a:t>
             </a:fld>
             <a:endParaRPr lang="en-US"/>
           </a:p>
@@ -2333,7 +2333,7 @@
           <a:p>
             <a:fld id="{4215C990-A328-409D-95CF-76DFE9640D99}" type="datetimeFigureOut">
               <a:rPr lang="en-US" smtClean="0"/>
-              <a:t>2/22/2017</a:t>
+              <a:t>2/23/2017</a:t>
             </a:fld>
             <a:endParaRPr lang="en-US"/>
           </a:p>
@@ -2544,7 +2544,7 @@
           <a:p>
             <a:fld id="{4215C990-A328-409D-95CF-76DFE9640D99}" type="datetimeFigureOut">
               <a:rPr lang="en-US" smtClean="0"/>
-              <a:t>2/22/2017</a:t>
+              <a:t>2/23/2017</a:t>
             </a:fld>
             <a:endParaRPr lang="en-US"/>
           </a:p>
@@ -4575,18 +4575,151 @@
           <p:cNvCxnSpPr>
             <a:cxnSpLocks/>
             <a:stCxn id="5" idx="1"/>
-            <a:endCxn id="53" idx="3"/>
+            <a:endCxn id="37" idx="3"/>
           </p:cNvCxnSpPr>
           <p:nvPr/>
         </p:nvCxnSpPr>
         <p:spPr>
           <a:xfrm rot="10800000">
-            <a:off x="9223069" y="2724932"/>
-            <a:ext cx="1452264" cy="1722044"/>
+            <a:off x="5254447" y="2724158"/>
+            <a:ext cx="5420886" cy="1722819"/>
           </a:xfrm>
           <a:prstGeom prst="bentConnector3">
             <a:avLst>
-              <a:gd name="adj1" fmla="val 50000"/>
+              <a:gd name="adj1" fmla="val 84076"/>
+            </a:avLst>
+          </a:prstGeom>
+          <a:ln w="15875">
+            <a:headEnd type="triangle"/>
+            <a:tailEnd type="triangle"/>
+          </a:ln>
+        </p:spPr>
+        <p:style>
+          <a:lnRef idx="1">
+            <a:schemeClr val="accent1"/>
+          </a:lnRef>
+          <a:fillRef idx="0">
+            <a:schemeClr val="accent1"/>
+          </a:fillRef>
+          <a:effectRef idx="0">
+            <a:schemeClr val="accent1"/>
+          </a:effectRef>
+          <a:fontRef idx="minor">
+            <a:schemeClr val="tx1"/>
+          </a:fontRef>
+        </p:style>
+      </p:cxnSp>
+      <p:grpSp>
+        <p:nvGrpSpPr>
+          <p:cNvPr id="4" name="Group 3"/>
+          <p:cNvGrpSpPr/>
+          <p:nvPr/>
+        </p:nvGrpSpPr>
+        <p:grpSpPr>
+          <a:xfrm>
+            <a:off x="10433929" y="5505811"/>
+            <a:ext cx="1344799" cy="1149622"/>
+            <a:chOff x="10433929" y="5505811"/>
+            <a:chExt cx="1344799" cy="1149622"/>
+          </a:xfrm>
+        </p:grpSpPr>
+        <p:pic>
+          <p:nvPicPr>
+            <p:cNvPr id="61" name="Picture 60"/>
+            <p:cNvPicPr>
+              <a:picLocks noChangeAspect="1"/>
+            </p:cNvPicPr>
+            <p:nvPr/>
+          </p:nvPicPr>
+          <p:blipFill>
+            <a:blip r:embed="rId11">
+              <a:extLst>
+                <a:ext uri="{28A0092B-C50C-407E-A947-70E740481C1C}">
+                  <a14:useLocalDpi xmlns:a14="http://schemas.microsoft.com/office/drawing/2010/main" val="0"/>
+                </a:ext>
+              </a:extLst>
+            </a:blip>
+            <a:stretch>
+              <a:fillRect/>
+            </a:stretch>
+          </p:blipFill>
+          <p:spPr>
+            <a:xfrm>
+              <a:off x="10678482" y="5505811"/>
+              <a:ext cx="780290" cy="780290"/>
+            </a:xfrm>
+            <a:prstGeom prst="rect">
+              <a:avLst/>
+            </a:prstGeom>
+          </p:spPr>
+        </p:pic>
+        <p:sp>
+          <p:nvSpPr>
+            <p:cNvPr id="64" name="TextBox 63"/>
+            <p:cNvSpPr txBox="1"/>
+            <p:nvPr/>
+          </p:nvSpPr>
+          <p:spPr>
+            <a:xfrm>
+              <a:off x="10433929" y="6286101"/>
+              <a:ext cx="1344799" cy="369332"/>
+            </a:xfrm>
+            <a:prstGeom prst="rect">
+              <a:avLst/>
+            </a:prstGeom>
+            <a:noFill/>
+          </p:spPr>
+          <p:txBody>
+            <a:bodyPr wrap="square" rtlCol="0">
+              <a:spAutoFit/>
+            </a:bodyPr>
+            <a:lstStyle/>
+            <a:p>
+              <a:pPr algn="ctr"/>
+              <a:r>
+                <a:rPr lang="en-US" dirty="0" err="1">
+                  <a:solidFill>
+                    <a:schemeClr val="tx1">
+                      <a:lumMod val="65000"/>
+                      <a:lumOff val="35000"/>
+                    </a:schemeClr>
+                  </a:solidFill>
+                </a:rPr>
+                <a:t>Redis</a:t>
+              </a:r>
+              <a:r>
+                <a:rPr lang="en-US" dirty="0">
+                  <a:solidFill>
+                    <a:schemeClr val="tx1">
+                      <a:lumMod val="65000"/>
+                      <a:lumOff val="35000"/>
+                    </a:schemeClr>
+                  </a:solidFill>
+                </a:rPr>
+                <a:t> Cache</a:t>
+              </a:r>
+            </a:p>
+          </p:txBody>
+        </p:sp>
+      </p:grpSp>
+      <p:cxnSp>
+        <p:nvCxnSpPr>
+          <p:cNvPr id="65" name="Connector: Elbow 64"/>
+          <p:cNvCxnSpPr>
+            <a:cxnSpLocks/>
+            <a:stCxn id="61" idx="1"/>
+            <a:endCxn id="37" idx="3"/>
+          </p:cNvCxnSpPr>
+          <p:nvPr/>
+        </p:nvCxnSpPr>
+        <p:spPr>
+          <a:xfrm rot="10800000">
+            <a:off x="5254448" y="2724158"/>
+            <a:ext cx="5424035" cy="3171799"/>
+          </a:xfrm>
+          <a:prstGeom prst="bentConnector3">
+            <a:avLst>
+              <a:gd name="adj1" fmla="val 84169"/>
             </a:avLst>
           </a:prstGeom>
           <a:ln w="15875">

</xml_diff>

<commit_message>
Move redis cache back into region deloyments.
</commit_message>
<xml_diff>
--- a/setup/AzureX.pptx
+++ b/setup/AzureX.pptx
@@ -5276,16 +5276,16 @@
       </p:cxnSp>
       <p:grpSp>
         <p:nvGrpSpPr>
-          <p:cNvPr id="18" name="Group 17"/>
+          <p:cNvPr id="34" name="Group 33"/>
           <p:cNvGrpSpPr/>
           <p:nvPr/>
         </p:nvGrpSpPr>
         <p:grpSpPr>
           <a:xfrm>
-            <a:off x="3288344" y="5432106"/>
-            <a:ext cx="5615310" cy="1322219"/>
-            <a:chOff x="2926097" y="4942879"/>
-            <a:chExt cx="5615310" cy="1322219"/>
+            <a:off x="3984043" y="5716673"/>
+            <a:ext cx="4239825" cy="1106789"/>
+            <a:chOff x="4663829" y="5446210"/>
+            <a:chExt cx="4239825" cy="1106789"/>
           </a:xfrm>
         </p:grpSpPr>
         <p:sp>
@@ -5296,8 +5296,8 @@
           </p:nvSpPr>
           <p:spPr>
             <a:xfrm>
-              <a:off x="2966518" y="5009338"/>
-              <a:ext cx="5574889" cy="1255760"/>
+              <a:off x="4765330" y="5498565"/>
+              <a:ext cx="4138324" cy="1054434"/>
             </a:xfrm>
             <a:prstGeom prst="rect">
               <a:avLst/>
@@ -5365,7 +5365,7 @@
           </p:blipFill>
           <p:spPr>
             <a:xfrm>
-              <a:off x="7715323" y="5229644"/>
+              <a:off x="8077570" y="5718871"/>
               <a:ext cx="569612" cy="569612"/>
             </a:xfrm>
             <a:prstGeom prst="rect">
@@ -5381,8 +5381,8 @@
           </p:nvSpPr>
           <p:spPr>
             <a:xfrm>
-              <a:off x="7458851" y="5741878"/>
-              <a:ext cx="1082556" cy="523220"/>
+              <a:off x="7821098" y="6231105"/>
+              <a:ext cx="1082556" cy="307777"/>
             </a:xfrm>
             <a:prstGeom prst="rect">
               <a:avLst/>
@@ -5405,7 +5405,7 @@
                     </a:schemeClr>
                   </a:solidFill>
                 </a:rPr>
-                <a:t>Application Insights</a:t>
+                <a:t>App Insights</a:t>
               </a:r>
             </a:p>
           </p:txBody>
@@ -5432,7 +5432,7 @@
           </p:blipFill>
           <p:spPr>
             <a:xfrm>
-              <a:off x="3356953" y="5229644"/>
+              <a:off x="5054264" y="5732988"/>
               <a:ext cx="569612" cy="569612"/>
             </a:xfrm>
             <a:prstGeom prst="rect">
@@ -5448,8 +5448,8 @@
           </p:nvSpPr>
           <p:spPr>
             <a:xfrm>
-              <a:off x="2966518" y="5741878"/>
-              <a:ext cx="1344799" cy="523220"/>
+              <a:off x="4663829" y="6245222"/>
+              <a:ext cx="1344799" cy="307777"/>
             </a:xfrm>
             <a:prstGeom prst="rect">
               <a:avLst/>
@@ -5475,25 +5475,11 @@
                 <a:t>Document DB</a:t>
               </a:r>
             </a:p>
-            <a:p>
-              <a:pPr algn="ctr"/>
-              <a:r>
-                <a:rPr lang="en-US" sz="1400" dirty="0">
-                  <a:solidFill>
-                    <a:schemeClr val="tx1">
-                      <a:lumMod val="65000"/>
-                      <a:lumOff val="35000"/>
-                    </a:schemeClr>
-                  </a:solidFill>
-                </a:rPr>
-                <a:t>(Mongo DB API)</a:t>
-              </a:r>
-            </a:p>
           </p:txBody>
         </p:sp>
         <p:pic>
           <p:nvPicPr>
-            <p:cNvPr id="129" name="Picture 128"/>
+            <p:cNvPr id="108" name="Picture 107"/>
             <p:cNvPicPr>
               <a:picLocks noChangeAspect="1"/>
             </p:cNvPicPr>
@@ -5513,85 +5499,7 @@
           </p:blipFill>
           <p:spPr>
             <a:xfrm>
-              <a:off x="4809743" y="5229644"/>
-              <a:ext cx="569612" cy="569612"/>
-            </a:xfrm>
-            <a:prstGeom prst="rect">
-              <a:avLst/>
-            </a:prstGeom>
-          </p:spPr>
-        </p:pic>
-        <p:sp>
-          <p:nvSpPr>
-            <p:cNvPr id="130" name="TextBox 129"/>
-            <p:cNvSpPr txBox="1"/>
-            <p:nvPr/>
-          </p:nvSpPr>
-          <p:spPr>
-            <a:xfrm>
-              <a:off x="4511887" y="5741878"/>
-              <a:ext cx="1171865" cy="307777"/>
-            </a:xfrm>
-            <a:prstGeom prst="rect">
-              <a:avLst/>
-            </a:prstGeom>
-            <a:noFill/>
-          </p:spPr>
-          <p:txBody>
-            <a:bodyPr wrap="square" rtlCol="0">
-              <a:spAutoFit/>
-            </a:bodyPr>
-            <a:lstStyle/>
-            <a:p>
-              <a:pPr algn="ctr"/>
-              <a:r>
-                <a:rPr lang="en-US" sz="1400" dirty="0" err="1">
-                  <a:solidFill>
-                    <a:schemeClr val="tx1">
-                      <a:lumMod val="65000"/>
-                      <a:lumOff val="35000"/>
-                    </a:schemeClr>
-                  </a:solidFill>
-                </a:rPr>
-                <a:t>Redis</a:t>
-              </a:r>
-              <a:r>
-                <a:rPr lang="en-US" sz="1400" dirty="0">
-                  <a:solidFill>
-                    <a:schemeClr val="tx1">
-                      <a:lumMod val="65000"/>
-                      <a:lumOff val="35000"/>
-                    </a:schemeClr>
-                  </a:solidFill>
-                </a:rPr>
-                <a:t> Cache</a:t>
-              </a:r>
-            </a:p>
-          </p:txBody>
-        </p:sp>
-        <p:pic>
-          <p:nvPicPr>
-            <p:cNvPr id="108" name="Picture 107"/>
-            <p:cNvPicPr>
-              <a:picLocks noChangeAspect="1"/>
-            </p:cNvPicPr>
-            <p:nvPr/>
-          </p:nvPicPr>
-          <p:blipFill>
-            <a:blip r:embed="rId8">
-              <a:extLst>
-                <a:ext uri="{28A0092B-C50C-407E-A947-70E740481C1C}">
-                  <a14:useLocalDpi xmlns:a14="http://schemas.microsoft.com/office/drawing/2010/main" val="0"/>
-                </a:ext>
-              </a:extLst>
-            </a:blip>
-            <a:stretch>
-              <a:fillRect/>
-            </a:stretch>
-          </p:blipFill>
-          <p:spPr>
-            <a:xfrm>
-              <a:off x="6262533" y="5229644"/>
+              <a:off x="6624780" y="5718871"/>
               <a:ext cx="569612" cy="569612"/>
             </a:xfrm>
             <a:prstGeom prst="rect">
@@ -5607,7 +5515,7 @@
           </p:nvSpPr>
           <p:spPr>
             <a:xfrm>
-              <a:off x="5997192" y="5741878"/>
+              <a:off x="6359439" y="6231105"/>
               <a:ext cx="1099339" cy="307777"/>
             </a:xfrm>
             <a:prstGeom prst="rect">
@@ -5644,7 +5552,7 @@
           </p:nvSpPr>
           <p:spPr>
             <a:xfrm>
-              <a:off x="2926097" y="4942879"/>
+              <a:off x="4733775" y="5446210"/>
               <a:ext cx="1344799" cy="307777"/>
             </a:xfrm>
             <a:prstGeom prst="rect">
@@ -5672,18 +5580,94 @@
           </p:txBody>
         </p:sp>
       </p:grpSp>
+      <p:cxnSp>
+        <p:nvCxnSpPr>
+          <p:cNvPr id="162" name="Connector: Elbow 161"/>
+          <p:cNvCxnSpPr>
+            <a:cxnSpLocks/>
+            <a:stCxn id="128" idx="2"/>
+            <a:endCxn id="15" idx="3"/>
+          </p:cNvCxnSpPr>
+          <p:nvPr/>
+        </p:nvCxnSpPr>
+        <p:spPr>
+          <a:xfrm rot="5400000">
+            <a:off x="8477207" y="5363689"/>
+            <a:ext cx="679217" cy="1185894"/>
+          </a:xfrm>
+          <a:prstGeom prst="bentConnector2">
+            <a:avLst/>
+          </a:prstGeom>
+          <a:ln w="15875">
+            <a:headEnd type="triangle"/>
+            <a:tailEnd type="triangle"/>
+          </a:ln>
+        </p:spPr>
+        <p:style>
+          <a:lnRef idx="1">
+            <a:schemeClr val="accent1"/>
+          </a:lnRef>
+          <a:fillRef idx="0">
+            <a:schemeClr val="accent1"/>
+          </a:fillRef>
+          <a:effectRef idx="0">
+            <a:schemeClr val="accent1"/>
+          </a:effectRef>
+          <a:fontRef idx="minor">
+            <a:schemeClr val="tx1"/>
+          </a:fontRef>
+        </p:style>
+      </p:cxnSp>
+      <p:cxnSp>
+        <p:nvCxnSpPr>
+          <p:cNvPr id="164" name="Connector: Elbow 163"/>
+          <p:cNvCxnSpPr>
+            <a:cxnSpLocks/>
+            <a:stCxn id="126" idx="2"/>
+            <a:endCxn id="15" idx="1"/>
+          </p:cNvCxnSpPr>
+          <p:nvPr/>
+        </p:nvCxnSpPr>
+        <p:spPr>
+          <a:xfrm rot="16200000" flipH="1">
+            <a:off x="3105375" y="5316076"/>
+            <a:ext cx="679216" cy="1281122"/>
+          </a:xfrm>
+          <a:prstGeom prst="bentConnector2">
+            <a:avLst/>
+          </a:prstGeom>
+          <a:ln w="15875">
+            <a:headEnd type="triangle"/>
+            <a:tailEnd type="triangle"/>
+          </a:ln>
+        </p:spPr>
+        <p:style>
+          <a:lnRef idx="1">
+            <a:schemeClr val="accent1"/>
+          </a:lnRef>
+          <a:fillRef idx="0">
+            <a:schemeClr val="accent1"/>
+          </a:fillRef>
+          <a:effectRef idx="0">
+            <a:schemeClr val="accent1"/>
+          </a:effectRef>
+          <a:fontRef idx="minor">
+            <a:schemeClr val="tx1"/>
+          </a:fontRef>
+        </p:style>
+      </p:cxnSp>
       <p:grpSp>
         <p:nvGrpSpPr>
-          <p:cNvPr id="35" name="Group 34"/>
+          <p:cNvPr id="40" name="Group 39"/>
           <p:cNvGrpSpPr/>
           <p:nvPr/>
         </p:nvGrpSpPr>
         <p:grpSpPr>
           <a:xfrm>
             <a:off x="0" y="779766"/>
-            <a:ext cx="5561076" cy="4186499"/>
+            <a:ext cx="5561076" cy="4897563"/>
             <a:chOff x="0" y="779766"/>
-            <a:chExt cx="5561076" cy="4186499"/>
+            <a:chExt cx="5561076" cy="4897563"/>
           </a:xfrm>
         </p:grpSpPr>
         <p:sp>
@@ -5695,7 +5679,7 @@
           <p:spPr>
             <a:xfrm>
               <a:off x="47767" y="820309"/>
-              <a:ext cx="5513309" cy="4145956"/>
+              <a:ext cx="5513309" cy="4796720"/>
             </a:xfrm>
             <a:prstGeom prst="rect">
               <a:avLst/>
@@ -5953,7 +5937,7 @@
                 <p:nvPr/>
               </p:nvPicPr>
               <p:blipFill>
-                <a:blip r:embed="rId9">
+                <a:blip r:embed="rId8">
                   <a:extLst>
                     <a:ext uri="{28A0092B-C50C-407E-A947-70E740481C1C}">
                       <a14:useLocalDpi xmlns:a14="http://schemas.microsoft.com/office/drawing/2010/main" val="0"/>
@@ -6020,11 +6004,11 @@
                 <p:nvPr/>
               </p:nvPicPr>
               <p:blipFill>
-                <a:blip r:embed="rId10">
+                <a:blip r:embed="rId9">
                   <a:extLst>
                     <a:ext uri="{BEBA8EAE-BF5A-486C-A8C5-ECC9F3942E4B}">
                       <a14:imgProps xmlns:a14="http://schemas.microsoft.com/office/drawing/2010/main">
-                        <a14:imgLayer r:embed="rId11">
+                        <a14:imgLayer r:embed="rId10">
                           <a14:imgEffect>
                             <a14:saturation sat="0"/>
                           </a14:imgEffect>
@@ -6191,7 +6175,7 @@
                 <p:nvPr/>
               </p:nvPicPr>
               <p:blipFill>
-                <a:blip r:embed="rId9">
+                <a:blip r:embed="rId8">
                   <a:extLst>
                     <a:ext uri="{28A0092B-C50C-407E-A947-70E740481C1C}">
                       <a14:useLocalDpi xmlns:a14="http://schemas.microsoft.com/office/drawing/2010/main" val="0"/>
@@ -6258,11 +6242,11 @@
                 <p:nvPr/>
               </p:nvPicPr>
               <p:blipFill>
-                <a:blip r:embed="rId10">
+                <a:blip r:embed="rId9">
                   <a:extLst>
                     <a:ext uri="{BEBA8EAE-BF5A-486C-A8C5-ECC9F3942E4B}">
                       <a14:imgProps xmlns:a14="http://schemas.microsoft.com/office/drawing/2010/main">
-                        <a14:imgLayer r:embed="rId11">
+                        <a14:imgLayer r:embed="rId10">
                           <a14:imgEffect>
                             <a14:saturation sat="0"/>
                           </a14:imgEffect>
@@ -6414,7 +6398,7 @@
                 <p:nvPr/>
               </p:nvPicPr>
               <p:blipFill>
-                <a:blip r:embed="rId12">
+                <a:blip r:embed="rId11">
                   <a:extLst>
                     <a:ext uri="{28A0092B-C50C-407E-A947-70E740481C1C}">
                       <a14:useLocalDpi xmlns:a14="http://schemas.microsoft.com/office/drawing/2010/main" val="0"/>
@@ -6496,7 +6480,7 @@
                 <p:nvPr/>
               </p:nvPicPr>
               <p:blipFill>
-                <a:blip r:embed="rId12">
+                <a:blip r:embed="rId11">
                   <a:extLst>
                     <a:ext uri="{28A0092B-C50C-407E-A947-70E740481C1C}">
                       <a14:useLocalDpi xmlns:a14="http://schemas.microsoft.com/office/drawing/2010/main" val="0"/>
@@ -6578,7 +6562,7 @@
                 <p:nvPr/>
               </p:nvPicPr>
               <p:blipFill>
-                <a:blip r:embed="rId13">
+                <a:blip r:embed="rId12">
                   <a:extLst>
                     <a:ext uri="{28A0092B-C50C-407E-A947-70E740481C1C}">
                       <a14:useLocalDpi xmlns:a14="http://schemas.microsoft.com/office/drawing/2010/main" val="0"/>
@@ -6653,11 +6637,11 @@
                 <p:nvPr/>
               </p:nvPicPr>
               <p:blipFill>
-                <a:blip r:embed="rId10">
+                <a:blip r:embed="rId9">
                   <a:extLst>
                     <a:ext uri="{BEBA8EAE-BF5A-486C-A8C5-ECC9F3942E4B}">
                       <a14:imgProps xmlns:a14="http://schemas.microsoft.com/office/drawing/2010/main">
-                        <a14:imgLayer r:embed="rId11">
+                        <a14:imgLayer r:embed="rId10">
                           <a14:imgEffect>
                             <a14:saturation sat="0"/>
                           </a14:imgEffect>
@@ -6962,19 +6946,97 @@
             </a:p>
           </p:txBody>
         </p:sp>
+        <p:pic>
+          <p:nvPicPr>
+            <p:cNvPr id="129" name="Picture 128"/>
+            <p:cNvPicPr>
+              <a:picLocks noChangeAspect="1"/>
+            </p:cNvPicPr>
+            <p:nvPr/>
+          </p:nvPicPr>
+          <p:blipFill>
+            <a:blip r:embed="rId13">
+              <a:extLst>
+                <a:ext uri="{28A0092B-C50C-407E-A947-70E740481C1C}">
+                  <a14:useLocalDpi xmlns:a14="http://schemas.microsoft.com/office/drawing/2010/main" val="0"/>
+                </a:ext>
+              </a:extLst>
+            </a:blip>
+            <a:stretch>
+              <a:fillRect/>
+            </a:stretch>
+          </p:blipFill>
+          <p:spPr>
+            <a:xfrm>
+              <a:off x="365470" y="4857318"/>
+              <a:ext cx="569612" cy="569612"/>
+            </a:xfrm>
+            <a:prstGeom prst="rect">
+              <a:avLst/>
+            </a:prstGeom>
+          </p:spPr>
+        </p:pic>
+        <p:sp>
+          <p:nvSpPr>
+            <p:cNvPr id="130" name="TextBox 129"/>
+            <p:cNvSpPr txBox="1"/>
+            <p:nvPr/>
+          </p:nvSpPr>
+          <p:spPr>
+            <a:xfrm>
+              <a:off x="67614" y="5369552"/>
+              <a:ext cx="1171865" cy="307777"/>
+            </a:xfrm>
+            <a:prstGeom prst="rect">
+              <a:avLst/>
+            </a:prstGeom>
+            <a:noFill/>
+          </p:spPr>
+          <p:txBody>
+            <a:bodyPr wrap="square" rtlCol="0">
+              <a:spAutoFit/>
+            </a:bodyPr>
+            <a:lstStyle/>
+            <a:p>
+              <a:pPr algn="ctr"/>
+              <a:r>
+                <a:rPr lang="en-US" sz="1400" dirty="0" err="1">
+                  <a:solidFill>
+                    <a:schemeClr val="tx1">
+                      <a:lumMod val="65000"/>
+                      <a:lumOff val="35000"/>
+                    </a:schemeClr>
+                  </a:solidFill>
+                </a:rPr>
+                <a:t>Redis</a:t>
+              </a:r>
+              <a:r>
+                <a:rPr lang="en-US" sz="1400" dirty="0">
+                  <a:solidFill>
+                    <a:schemeClr val="tx1">
+                      <a:lumMod val="65000"/>
+                      <a:lumOff val="35000"/>
+                    </a:schemeClr>
+                  </a:solidFill>
+                </a:rPr>
+                <a:t> Cache</a:t>
+              </a:r>
+            </a:p>
+          </p:txBody>
+        </p:sp>
       </p:grpSp>
       <p:grpSp>
         <p:nvGrpSpPr>
-          <p:cNvPr id="36" name="Group 35"/>
+          <p:cNvPr id="42" name="Group 41"/>
           <p:cNvGrpSpPr/>
           <p:nvPr/>
         </p:nvGrpSpPr>
         <p:grpSpPr>
           <a:xfrm>
             <a:off x="6605340" y="784609"/>
-            <a:ext cx="5561076" cy="4186499"/>
+            <a:ext cx="5628047" cy="4879256"/>
             <a:chOff x="6605340" y="784609"/>
-            <a:chExt cx="5561076" cy="4186499"/>
+            <a:chExt cx="5628047" cy="4879256"/>
           </a:xfrm>
         </p:grpSpPr>
         <p:sp>
@@ -6986,7 +7048,7 @@
           <p:spPr>
             <a:xfrm>
               <a:off x="6653107" y="825152"/>
-              <a:ext cx="5513309" cy="4145956"/>
+              <a:ext cx="5513309" cy="4791876"/>
             </a:xfrm>
             <a:prstGeom prst="rect">
               <a:avLst/>
@@ -7244,7 +7306,7 @@
                 <p:nvPr/>
               </p:nvPicPr>
               <p:blipFill>
-                <a:blip r:embed="rId9">
+                <a:blip r:embed="rId8">
                   <a:extLst>
                     <a:ext uri="{28A0092B-C50C-407E-A947-70E740481C1C}">
                       <a14:useLocalDpi xmlns:a14="http://schemas.microsoft.com/office/drawing/2010/main" val="0"/>
@@ -7311,11 +7373,11 @@
                 <p:nvPr/>
               </p:nvPicPr>
               <p:blipFill>
-                <a:blip r:embed="rId10">
+                <a:blip r:embed="rId9">
                   <a:extLst>
                     <a:ext uri="{BEBA8EAE-BF5A-486C-A8C5-ECC9F3942E4B}">
                       <a14:imgProps xmlns:a14="http://schemas.microsoft.com/office/drawing/2010/main">
-                        <a14:imgLayer r:embed="rId11">
+                        <a14:imgLayer r:embed="rId10">
                           <a14:imgEffect>
                             <a14:saturation sat="0"/>
                           </a14:imgEffect>
@@ -7482,7 +7544,7 @@
                 <p:nvPr/>
               </p:nvPicPr>
               <p:blipFill>
-                <a:blip r:embed="rId9">
+                <a:blip r:embed="rId8">
                   <a:extLst>
                     <a:ext uri="{28A0092B-C50C-407E-A947-70E740481C1C}">
                       <a14:useLocalDpi xmlns:a14="http://schemas.microsoft.com/office/drawing/2010/main" val="0"/>
@@ -7549,11 +7611,11 @@
                 <p:nvPr/>
               </p:nvPicPr>
               <p:blipFill>
-                <a:blip r:embed="rId10">
+                <a:blip r:embed="rId9">
                   <a:extLst>
                     <a:ext uri="{BEBA8EAE-BF5A-486C-A8C5-ECC9F3942E4B}">
                       <a14:imgProps xmlns:a14="http://schemas.microsoft.com/office/drawing/2010/main">
-                        <a14:imgLayer r:embed="rId11">
+                        <a14:imgLayer r:embed="rId10">
                           <a14:imgEffect>
                             <a14:saturation sat="0"/>
                           </a14:imgEffect>
@@ -7705,7 +7767,7 @@
                 <p:nvPr/>
               </p:nvPicPr>
               <p:blipFill>
-                <a:blip r:embed="rId12">
+                <a:blip r:embed="rId11">
                   <a:extLst>
                     <a:ext uri="{28A0092B-C50C-407E-A947-70E740481C1C}">
                       <a14:useLocalDpi xmlns:a14="http://schemas.microsoft.com/office/drawing/2010/main" val="0"/>
@@ -7787,7 +7849,7 @@
                 <p:nvPr/>
               </p:nvPicPr>
               <p:blipFill>
-                <a:blip r:embed="rId12">
+                <a:blip r:embed="rId11">
                   <a:extLst>
                     <a:ext uri="{28A0092B-C50C-407E-A947-70E740481C1C}">
                       <a14:useLocalDpi xmlns:a14="http://schemas.microsoft.com/office/drawing/2010/main" val="0"/>
@@ -7869,7 +7931,7 @@
                 <p:nvPr/>
               </p:nvPicPr>
               <p:blipFill>
-                <a:blip r:embed="rId13">
+                <a:blip r:embed="rId12">
                   <a:extLst>
                     <a:ext uri="{28A0092B-C50C-407E-A947-70E740481C1C}">
                       <a14:useLocalDpi xmlns:a14="http://schemas.microsoft.com/office/drawing/2010/main" val="0"/>
@@ -7944,11 +8006,11 @@
                 <p:nvPr/>
               </p:nvPicPr>
               <p:blipFill>
-                <a:blip r:embed="rId10">
+                <a:blip r:embed="rId9">
                   <a:extLst>
                     <a:ext uri="{BEBA8EAE-BF5A-486C-A8C5-ECC9F3942E4B}">
                       <a14:imgProps xmlns:a14="http://schemas.microsoft.com/office/drawing/2010/main">
-                        <a14:imgLayer r:embed="rId11">
+                        <a14:imgLayer r:embed="rId10">
                           <a14:imgEffect>
                             <a14:saturation sat="0"/>
                           </a14:imgEffect>
@@ -8253,83 +8315,85 @@
             </a:p>
           </p:txBody>
         </p:sp>
+        <p:pic>
+          <p:nvPicPr>
+            <p:cNvPr id="124" name="Picture 123"/>
+            <p:cNvPicPr>
+              <a:picLocks noChangeAspect="1"/>
+            </p:cNvPicPr>
+            <p:nvPr/>
+          </p:nvPicPr>
+          <p:blipFill>
+            <a:blip r:embed="rId13">
+              <a:extLst>
+                <a:ext uri="{28A0092B-C50C-407E-A947-70E740481C1C}">
+                  <a14:useLocalDpi xmlns:a14="http://schemas.microsoft.com/office/drawing/2010/main" val="0"/>
+                </a:ext>
+              </a:extLst>
+            </a:blip>
+            <a:stretch>
+              <a:fillRect/>
+            </a:stretch>
+          </p:blipFill>
+          <p:spPr>
+            <a:xfrm>
+              <a:off x="11359378" y="4843854"/>
+              <a:ext cx="569612" cy="569612"/>
+            </a:xfrm>
+            <a:prstGeom prst="rect">
+              <a:avLst/>
+            </a:prstGeom>
+          </p:spPr>
+        </p:pic>
+        <p:sp>
+          <p:nvSpPr>
+            <p:cNvPr id="125" name="TextBox 124"/>
+            <p:cNvSpPr txBox="1"/>
+            <p:nvPr/>
+          </p:nvSpPr>
+          <p:spPr>
+            <a:xfrm>
+              <a:off x="11061522" y="5356088"/>
+              <a:ext cx="1171865" cy="307777"/>
+            </a:xfrm>
+            <a:prstGeom prst="rect">
+              <a:avLst/>
+            </a:prstGeom>
+            <a:noFill/>
+          </p:spPr>
+          <p:txBody>
+            <a:bodyPr wrap="square" rtlCol="0">
+              <a:spAutoFit/>
+            </a:bodyPr>
+            <a:lstStyle/>
+            <a:p>
+              <a:pPr algn="ctr"/>
+              <a:r>
+                <a:rPr lang="en-US" sz="1400" dirty="0" err="1">
+                  <a:solidFill>
+                    <a:schemeClr val="tx1">
+                      <a:lumMod val="65000"/>
+                      <a:lumOff val="35000"/>
+                    </a:schemeClr>
+                  </a:solidFill>
+                </a:rPr>
+                <a:t>Redis</a:t>
+              </a:r>
+              <a:r>
+                <a:rPr lang="en-US" sz="1400" dirty="0">
+                  <a:solidFill>
+                    <a:schemeClr val="tx1">
+                      <a:lumMod val="65000"/>
+                      <a:lumOff val="35000"/>
+                    </a:schemeClr>
+                  </a:solidFill>
+                </a:rPr>
+                <a:t> Cache</a:t>
+              </a:r>
+            </a:p>
+          </p:txBody>
+        </p:sp>
       </p:grpSp>
-      <p:cxnSp>
-        <p:nvCxnSpPr>
-          <p:cNvPr id="162" name="Connector: Elbow 161"/>
-          <p:cNvCxnSpPr>
-            <a:cxnSpLocks/>
-            <a:stCxn id="128" idx="2"/>
-            <a:endCxn id="15" idx="3"/>
-          </p:cNvCxnSpPr>
-          <p:nvPr/>
-        </p:nvCxnSpPr>
-        <p:spPr>
-          <a:xfrm rot="5400000">
-            <a:off x="8579040" y="5295722"/>
-            <a:ext cx="1155337" cy="506108"/>
-          </a:xfrm>
-          <a:prstGeom prst="bentConnector2">
-            <a:avLst/>
-          </a:prstGeom>
-          <a:ln w="15875">
-            <a:headEnd type="triangle"/>
-            <a:tailEnd type="triangle"/>
-          </a:ln>
-        </p:spPr>
-        <p:style>
-          <a:lnRef idx="1">
-            <a:schemeClr val="accent1"/>
-          </a:lnRef>
-          <a:fillRef idx="0">
-            <a:schemeClr val="accent1"/>
-          </a:fillRef>
-          <a:effectRef idx="0">
-            <a:schemeClr val="accent1"/>
-          </a:effectRef>
-          <a:fontRef idx="minor">
-            <a:schemeClr val="tx1"/>
-          </a:fontRef>
-        </p:style>
-      </p:cxnSp>
-      <p:cxnSp>
-        <p:nvCxnSpPr>
-          <p:cNvPr id="164" name="Connector: Elbow 163"/>
-          <p:cNvCxnSpPr>
-            <a:cxnSpLocks/>
-            <a:stCxn id="126" idx="2"/>
-            <a:endCxn id="15" idx="1"/>
-          </p:cNvCxnSpPr>
-          <p:nvPr/>
-        </p:nvCxnSpPr>
-        <p:spPr>
-          <a:xfrm rot="16200000" flipH="1">
-            <a:off x="2486503" y="5284183"/>
-            <a:ext cx="1160180" cy="524343"/>
-          </a:xfrm>
-          <a:prstGeom prst="bentConnector2">
-            <a:avLst/>
-          </a:prstGeom>
-          <a:ln w="15875">
-            <a:headEnd type="triangle"/>
-            <a:tailEnd type="triangle"/>
-          </a:ln>
-        </p:spPr>
-        <p:style>
-          <a:lnRef idx="1">
-            <a:schemeClr val="accent1"/>
-          </a:lnRef>
-          <a:fillRef idx="0">
-            <a:schemeClr val="accent1"/>
-          </a:fillRef>
-          <a:effectRef idx="0">
-            <a:schemeClr val="accent1"/>
-          </a:effectRef>
-          <a:fontRef idx="minor">
-            <a:schemeClr val="tx1"/>
-          </a:fontRef>
-        </p:style>
-      </p:cxnSp>
     </p:spTree>
     <p:extLst>
       <p:ext uri="{BB962C8B-B14F-4D97-AF65-F5344CB8AC3E}">

</xml_diff>

<commit_message>
Add CDN to archtiecture diagram.
</commit_message>
<xml_diff>
--- a/setup/AzureX.pptx
+++ b/setup/AzureX.pptx
@@ -5274,312 +5274,41 @@
           </a:fontRef>
         </p:style>
       </p:cxnSp>
-      <p:grpSp>
-        <p:nvGrpSpPr>
-          <p:cNvPr id="34" name="Group 33"/>
-          <p:cNvGrpSpPr/>
+      <p:sp>
+        <p:nvSpPr>
+          <p:cNvPr id="114" name="TextBox 113"/>
+          <p:cNvSpPr txBox="1"/>
           <p:nvPr/>
-        </p:nvGrpSpPr>
-        <p:grpSpPr>
+        </p:nvSpPr>
+        <p:spPr>
           <a:xfrm>
-            <a:off x="3984043" y="5716673"/>
-            <a:ext cx="4239825" cy="1106789"/>
-            <a:chOff x="4663829" y="5446210"/>
-            <a:chExt cx="4239825" cy="1106789"/>
+            <a:off x="4053989" y="5716673"/>
+            <a:ext cx="1344799" cy="307777"/>
           </a:xfrm>
-        </p:grpSpPr>
-        <p:sp>
-          <p:nvSpPr>
-            <p:cNvPr id="15" name="Rectangle 14"/>
-            <p:cNvSpPr/>
-            <p:nvPr/>
-          </p:nvSpPr>
-          <p:spPr>
-            <a:xfrm>
-              <a:off x="4765330" y="5498565"/>
-              <a:ext cx="4138324" cy="1054434"/>
-            </a:xfrm>
-            <a:prstGeom prst="rect">
-              <a:avLst/>
-            </a:prstGeom>
-            <a:solidFill>
-              <a:schemeClr val="accent6">
-                <a:lumMod val="40000"/>
-                <a:lumOff val="60000"/>
-                <a:alpha val="43000"/>
-              </a:schemeClr>
-            </a:solidFill>
-            <a:ln>
-              <a:solidFill>
-                <a:schemeClr val="accent6">
-                  <a:lumMod val="60000"/>
-                  <a:lumOff val="40000"/>
-                </a:schemeClr>
-              </a:solidFill>
-            </a:ln>
-          </p:spPr>
-          <p:style>
-            <a:lnRef idx="2">
-              <a:schemeClr val="accent1">
-                <a:shade val="50000"/>
-              </a:schemeClr>
-            </a:lnRef>
-            <a:fillRef idx="1">
-              <a:schemeClr val="accent1"/>
-            </a:fillRef>
-            <a:effectRef idx="0">
-              <a:schemeClr val="accent1"/>
-            </a:effectRef>
-            <a:fontRef idx="minor">
-              <a:schemeClr val="lt1"/>
-            </a:fontRef>
-          </p:style>
-          <p:txBody>
-            <a:bodyPr rtlCol="0" anchor="ctr"/>
-            <a:lstStyle/>
-            <a:p>
-              <a:pPr algn="ctr"/>
-              <a:endParaRPr lang="en-US"/>
-            </a:p>
-          </p:txBody>
-        </p:sp>
-        <p:pic>
-          <p:nvPicPr>
-            <p:cNvPr id="99" name="Picture 98"/>
-            <p:cNvPicPr>
-              <a:picLocks noChangeAspect="1"/>
-            </p:cNvPicPr>
-            <p:nvPr/>
-          </p:nvPicPr>
-          <p:blipFill>
-            <a:blip r:embed="rId5">
-              <a:extLst>
-                <a:ext uri="{28A0092B-C50C-407E-A947-70E740481C1C}">
-                  <a14:useLocalDpi xmlns:a14="http://schemas.microsoft.com/office/drawing/2010/main" val="0"/>
-                </a:ext>
-              </a:extLst>
-            </a:blip>
-            <a:stretch>
-              <a:fillRect/>
-            </a:stretch>
-          </p:blipFill>
-          <p:spPr>
-            <a:xfrm>
-              <a:off x="8077570" y="5718871"/>
-              <a:ext cx="569612" cy="569612"/>
-            </a:xfrm>
-            <a:prstGeom prst="rect">
-              <a:avLst/>
-            </a:prstGeom>
-          </p:spPr>
-        </p:pic>
-        <p:sp>
-          <p:nvSpPr>
-            <p:cNvPr id="102" name="TextBox 101"/>
-            <p:cNvSpPr txBox="1"/>
-            <p:nvPr/>
-          </p:nvSpPr>
-          <p:spPr>
-            <a:xfrm>
-              <a:off x="7821098" y="6231105"/>
-              <a:ext cx="1082556" cy="307777"/>
-            </a:xfrm>
-            <a:prstGeom prst="rect">
-              <a:avLst/>
-            </a:prstGeom>
-            <a:noFill/>
-          </p:spPr>
-          <p:txBody>
-            <a:bodyPr wrap="square" rtlCol="0">
-              <a:spAutoFit/>
-            </a:bodyPr>
-            <a:lstStyle/>
-            <a:p>
-              <a:pPr algn="ctr"/>
-              <a:r>
-                <a:rPr lang="en-US" sz="1400" dirty="0">
-                  <a:solidFill>
-                    <a:schemeClr val="tx1">
-                      <a:lumMod val="65000"/>
-                      <a:lumOff val="35000"/>
-                    </a:schemeClr>
-                  </a:solidFill>
-                </a:rPr>
-                <a:t>App Insights</a:t>
-              </a:r>
-            </a:p>
-          </p:txBody>
-        </p:sp>
-        <p:pic>
-          <p:nvPicPr>
-            <p:cNvPr id="131" name="Picture 130"/>
-            <p:cNvPicPr>
-              <a:picLocks noChangeAspect="1"/>
-            </p:cNvPicPr>
-            <p:nvPr/>
-          </p:nvPicPr>
-          <p:blipFill>
-            <a:blip r:embed="rId6">
-              <a:extLst>
-                <a:ext uri="{28A0092B-C50C-407E-A947-70E740481C1C}">
-                  <a14:useLocalDpi xmlns:a14="http://schemas.microsoft.com/office/drawing/2010/main" val="0"/>
-                </a:ext>
-              </a:extLst>
-            </a:blip>
-            <a:stretch>
-              <a:fillRect/>
-            </a:stretch>
-          </p:blipFill>
-          <p:spPr>
-            <a:xfrm>
-              <a:off x="5054264" y="5732988"/>
-              <a:ext cx="569612" cy="569612"/>
-            </a:xfrm>
-            <a:prstGeom prst="rect">
-              <a:avLst/>
-            </a:prstGeom>
-          </p:spPr>
-        </p:pic>
-        <p:sp>
-          <p:nvSpPr>
-            <p:cNvPr id="132" name="TextBox 131"/>
-            <p:cNvSpPr txBox="1"/>
-            <p:nvPr/>
-          </p:nvSpPr>
-          <p:spPr>
-            <a:xfrm>
-              <a:off x="4663829" y="6245222"/>
-              <a:ext cx="1344799" cy="307777"/>
-            </a:xfrm>
-            <a:prstGeom prst="rect">
-              <a:avLst/>
-            </a:prstGeom>
-            <a:noFill/>
-          </p:spPr>
-          <p:txBody>
-            <a:bodyPr wrap="square" rtlCol="0">
-              <a:spAutoFit/>
-            </a:bodyPr>
-            <a:lstStyle/>
-            <a:p>
-              <a:pPr algn="ctr"/>
-              <a:r>
-                <a:rPr lang="en-US" sz="1400" dirty="0">
-                  <a:solidFill>
-                    <a:schemeClr val="tx1">
-                      <a:lumMod val="65000"/>
-                      <a:lumOff val="35000"/>
-                    </a:schemeClr>
-                  </a:solidFill>
-                </a:rPr>
-                <a:t>Document DB</a:t>
-              </a:r>
-            </a:p>
-          </p:txBody>
-        </p:sp>
-        <p:pic>
-          <p:nvPicPr>
-            <p:cNvPr id="108" name="Picture 107"/>
-            <p:cNvPicPr>
-              <a:picLocks noChangeAspect="1"/>
-            </p:cNvPicPr>
-            <p:nvPr/>
-          </p:nvPicPr>
-          <p:blipFill>
-            <a:blip r:embed="rId7">
-              <a:extLst>
-                <a:ext uri="{28A0092B-C50C-407E-A947-70E740481C1C}">
-                  <a14:useLocalDpi xmlns:a14="http://schemas.microsoft.com/office/drawing/2010/main" val="0"/>
-                </a:ext>
-              </a:extLst>
-            </a:blip>
-            <a:stretch>
-              <a:fillRect/>
-            </a:stretch>
-          </p:blipFill>
-          <p:spPr>
-            <a:xfrm>
-              <a:off x="6624780" y="5718871"/>
-              <a:ext cx="569612" cy="569612"/>
-            </a:xfrm>
-            <a:prstGeom prst="rect">
-              <a:avLst/>
-            </a:prstGeom>
-          </p:spPr>
-        </p:pic>
-        <p:sp>
-          <p:nvSpPr>
-            <p:cNvPr id="112" name="TextBox 111"/>
-            <p:cNvSpPr txBox="1"/>
-            <p:nvPr/>
-          </p:nvSpPr>
-          <p:spPr>
-            <a:xfrm>
-              <a:off x="6359439" y="6231105"/>
-              <a:ext cx="1099339" cy="307777"/>
-            </a:xfrm>
-            <a:prstGeom prst="rect">
-              <a:avLst/>
-            </a:prstGeom>
-            <a:noFill/>
-          </p:spPr>
-          <p:txBody>
-            <a:bodyPr wrap="square" rtlCol="0">
-              <a:spAutoFit/>
-            </a:bodyPr>
-            <a:lstStyle/>
-            <a:p>
-              <a:pPr algn="ctr"/>
-              <a:r>
-                <a:rPr lang="en-US" sz="1400" dirty="0">
-                  <a:solidFill>
-                    <a:schemeClr val="tx1">
-                      <a:lumMod val="65000"/>
-                      <a:lumOff val="35000"/>
-                    </a:schemeClr>
-                  </a:solidFill>
-                </a:rPr>
-                <a:t>App Storage</a:t>
-              </a:r>
-            </a:p>
-          </p:txBody>
-        </p:sp>
-        <p:sp>
-          <p:nvSpPr>
-            <p:cNvPr id="114" name="TextBox 113"/>
-            <p:cNvSpPr txBox="1"/>
-            <p:nvPr/>
-          </p:nvSpPr>
-          <p:spPr>
-            <a:xfrm>
-              <a:off x="4733775" y="5446210"/>
-              <a:ext cx="1344799" cy="307777"/>
-            </a:xfrm>
-            <a:prstGeom prst="rect">
-              <a:avLst/>
-            </a:prstGeom>
-            <a:noFill/>
-          </p:spPr>
-          <p:txBody>
-            <a:bodyPr wrap="square" rtlCol="0">
-              <a:spAutoFit/>
-            </a:bodyPr>
-            <a:lstStyle/>
-            <a:p>
-              <a:r>
-                <a:rPr lang="en-US" sz="1400" dirty="0">
-                  <a:solidFill>
-                    <a:schemeClr val="accent6">
-                      <a:lumMod val="75000"/>
-                    </a:schemeClr>
-                  </a:solidFill>
-                </a:rPr>
-                <a:t>Resource Group</a:t>
-              </a:r>
-            </a:p>
-          </p:txBody>
-        </p:sp>
-      </p:grpSp>
+          <a:prstGeom prst="rect">
+            <a:avLst/>
+          </a:prstGeom>
+          <a:noFill/>
+        </p:spPr>
+        <p:txBody>
+          <a:bodyPr wrap="square" rtlCol="0">
+            <a:spAutoFit/>
+          </a:bodyPr>
+          <a:lstStyle/>
+          <a:p>
+            <a:r>
+              <a:rPr lang="en-US" sz="1400" dirty="0">
+                <a:solidFill>
+                  <a:schemeClr val="accent6">
+                    <a:lumMod val="75000"/>
+                  </a:schemeClr>
+                </a:solidFill>
+              </a:rPr>
+              <a:t>Resource Group</a:t>
+            </a:r>
+          </a:p>
+        </p:txBody>
+      </p:sp>
       <p:cxnSp>
         <p:nvCxnSpPr>
           <p:cNvPr id="162" name="Connector: Elbow 161"/>
@@ -5592,8 +5321,8 @@
         </p:nvCxnSpPr>
         <p:spPr>
           <a:xfrm rot="5400000">
-            <a:off x="8477207" y="5363689"/>
-            <a:ext cx="679217" cy="1185894"/>
+            <a:off x="8777250" y="5635942"/>
+            <a:ext cx="604590" cy="660434"/>
           </a:xfrm>
           <a:prstGeom prst="bentConnector2">
             <a:avLst/>
@@ -5630,8 +5359,8 @@
         </p:nvCxnSpPr>
         <p:spPr>
           <a:xfrm rot="16200000" flipH="1">
-            <a:off x="3105375" y="5316076"/>
-            <a:ext cx="679216" cy="1281122"/>
+            <a:off x="2812356" y="5655928"/>
+            <a:ext cx="604591" cy="620459"/>
           </a:xfrm>
           <a:prstGeom prst="bentConnector2">
             <a:avLst/>
@@ -5665,9 +5394,9 @@
         <p:grpSpPr>
           <a:xfrm>
             <a:off x="0" y="779766"/>
-            <a:ext cx="5561076" cy="4897563"/>
+            <a:ext cx="5561076" cy="4915377"/>
             <a:chOff x="0" y="779766"/>
-            <a:chExt cx="5561076" cy="4897563"/>
+            <a:chExt cx="5561076" cy="4915377"/>
           </a:xfrm>
         </p:grpSpPr>
         <p:sp>
@@ -5678,8 +5407,8 @@
           </p:nvSpPr>
           <p:spPr>
             <a:xfrm>
-              <a:off x="47767" y="820309"/>
-              <a:ext cx="5513309" cy="4796720"/>
+              <a:off x="47767" y="820308"/>
+              <a:ext cx="5513309" cy="4843555"/>
             </a:xfrm>
             <a:prstGeom prst="rect">
               <a:avLst/>
@@ -5937,7 +5666,7 @@
                 <p:nvPr/>
               </p:nvPicPr>
               <p:blipFill>
-                <a:blip r:embed="rId8">
+                <a:blip r:embed="rId5">
                   <a:extLst>
                     <a:ext uri="{28A0092B-C50C-407E-A947-70E740481C1C}">
                       <a14:useLocalDpi xmlns:a14="http://schemas.microsoft.com/office/drawing/2010/main" val="0"/>
@@ -6004,11 +5733,11 @@
                 <p:nvPr/>
               </p:nvPicPr>
               <p:blipFill>
-                <a:blip r:embed="rId9">
+                <a:blip r:embed="rId6">
                   <a:extLst>
                     <a:ext uri="{BEBA8EAE-BF5A-486C-A8C5-ECC9F3942E4B}">
                       <a14:imgProps xmlns:a14="http://schemas.microsoft.com/office/drawing/2010/main">
-                        <a14:imgLayer r:embed="rId10">
+                        <a14:imgLayer r:embed="rId7">
                           <a14:imgEffect>
                             <a14:saturation sat="0"/>
                           </a14:imgEffect>
@@ -6175,7 +5904,7 @@
                 <p:nvPr/>
               </p:nvPicPr>
               <p:blipFill>
-                <a:blip r:embed="rId8">
+                <a:blip r:embed="rId5">
                   <a:extLst>
                     <a:ext uri="{28A0092B-C50C-407E-A947-70E740481C1C}">
                       <a14:useLocalDpi xmlns:a14="http://schemas.microsoft.com/office/drawing/2010/main" val="0"/>
@@ -6242,11 +5971,11 @@
                 <p:nvPr/>
               </p:nvPicPr>
               <p:blipFill>
-                <a:blip r:embed="rId9">
+                <a:blip r:embed="rId6">
                   <a:extLst>
                     <a:ext uri="{BEBA8EAE-BF5A-486C-A8C5-ECC9F3942E4B}">
                       <a14:imgProps xmlns:a14="http://schemas.microsoft.com/office/drawing/2010/main">
-                        <a14:imgLayer r:embed="rId10">
+                        <a14:imgLayer r:embed="rId7">
                           <a14:imgEffect>
                             <a14:saturation sat="0"/>
                           </a14:imgEffect>
@@ -6398,7 +6127,7 @@
                 <p:nvPr/>
               </p:nvPicPr>
               <p:blipFill>
-                <a:blip r:embed="rId11">
+                <a:blip r:embed="rId8">
                   <a:extLst>
                     <a:ext uri="{28A0092B-C50C-407E-A947-70E740481C1C}">
                       <a14:useLocalDpi xmlns:a14="http://schemas.microsoft.com/office/drawing/2010/main" val="0"/>
@@ -6480,7 +6209,7 @@
                 <p:nvPr/>
               </p:nvPicPr>
               <p:blipFill>
-                <a:blip r:embed="rId11">
+                <a:blip r:embed="rId8">
                   <a:extLst>
                     <a:ext uri="{28A0092B-C50C-407E-A947-70E740481C1C}">
                       <a14:useLocalDpi xmlns:a14="http://schemas.microsoft.com/office/drawing/2010/main" val="0"/>
@@ -6562,7 +6291,7 @@
                 <p:nvPr/>
               </p:nvPicPr>
               <p:blipFill>
-                <a:blip r:embed="rId12">
+                <a:blip r:embed="rId9">
                   <a:extLst>
                     <a:ext uri="{28A0092B-C50C-407E-A947-70E740481C1C}">
                       <a14:useLocalDpi xmlns:a14="http://schemas.microsoft.com/office/drawing/2010/main" val="0"/>
@@ -6637,11 +6366,11 @@
                 <p:nvPr/>
               </p:nvPicPr>
               <p:blipFill>
-                <a:blip r:embed="rId9">
+                <a:blip r:embed="rId6">
                   <a:extLst>
                     <a:ext uri="{BEBA8EAE-BF5A-486C-A8C5-ECC9F3942E4B}">
                       <a14:imgProps xmlns:a14="http://schemas.microsoft.com/office/drawing/2010/main">
-                        <a14:imgLayer r:embed="rId10">
+                        <a14:imgLayer r:embed="rId7">
                           <a14:imgEffect>
                             <a14:saturation sat="0"/>
                           </a14:imgEffect>
@@ -6955,7 +6684,7 @@
             <p:nvPr/>
           </p:nvPicPr>
           <p:blipFill>
-            <a:blip r:embed="rId13">
+            <a:blip r:embed="rId10">
               <a:extLst>
                 <a:ext uri="{28A0092B-C50C-407E-A947-70E740481C1C}">
                   <a14:useLocalDpi xmlns:a14="http://schemas.microsoft.com/office/drawing/2010/main" val="0"/>
@@ -6968,7 +6697,7 @@
           </p:blipFill>
           <p:spPr>
             <a:xfrm>
-              <a:off x="365470" y="4857318"/>
+              <a:off x="365470" y="4875132"/>
               <a:ext cx="569612" cy="569612"/>
             </a:xfrm>
             <a:prstGeom prst="rect">
@@ -6984,7 +6713,7 @@
           </p:nvSpPr>
           <p:spPr>
             <a:xfrm>
-              <a:off x="67614" y="5369552"/>
+              <a:off x="67614" y="5387366"/>
               <a:ext cx="1171865" cy="307777"/>
             </a:xfrm>
             <a:prstGeom prst="rect">
@@ -7034,9 +6763,9 @@
         <p:grpSpPr>
           <a:xfrm>
             <a:off x="6605340" y="784609"/>
-            <a:ext cx="5628047" cy="4879256"/>
+            <a:ext cx="5592419" cy="4908946"/>
             <a:chOff x="6605340" y="784609"/>
-            <a:chExt cx="5628047" cy="4879256"/>
+            <a:chExt cx="5592419" cy="4908946"/>
           </a:xfrm>
         </p:grpSpPr>
         <p:sp>
@@ -7047,8 +6776,8 @@
           </p:nvSpPr>
           <p:spPr>
             <a:xfrm>
-              <a:off x="6653107" y="825152"/>
-              <a:ext cx="5513309" cy="4791876"/>
+              <a:off x="6653107" y="825151"/>
+              <a:ext cx="5513309" cy="4838713"/>
             </a:xfrm>
             <a:prstGeom prst="rect">
               <a:avLst/>
@@ -7306,7 +7035,7 @@
                 <p:nvPr/>
               </p:nvPicPr>
               <p:blipFill>
-                <a:blip r:embed="rId8">
+                <a:blip r:embed="rId5">
                   <a:extLst>
                     <a:ext uri="{28A0092B-C50C-407E-A947-70E740481C1C}">
                       <a14:useLocalDpi xmlns:a14="http://schemas.microsoft.com/office/drawing/2010/main" val="0"/>
@@ -7373,11 +7102,11 @@
                 <p:nvPr/>
               </p:nvPicPr>
               <p:blipFill>
-                <a:blip r:embed="rId9">
+                <a:blip r:embed="rId6">
                   <a:extLst>
                     <a:ext uri="{BEBA8EAE-BF5A-486C-A8C5-ECC9F3942E4B}">
                       <a14:imgProps xmlns:a14="http://schemas.microsoft.com/office/drawing/2010/main">
-                        <a14:imgLayer r:embed="rId10">
+                        <a14:imgLayer r:embed="rId7">
                           <a14:imgEffect>
                             <a14:saturation sat="0"/>
                           </a14:imgEffect>
@@ -7544,7 +7273,7 @@
                 <p:nvPr/>
               </p:nvPicPr>
               <p:blipFill>
-                <a:blip r:embed="rId8">
+                <a:blip r:embed="rId5">
                   <a:extLst>
                     <a:ext uri="{28A0092B-C50C-407E-A947-70E740481C1C}">
                       <a14:useLocalDpi xmlns:a14="http://schemas.microsoft.com/office/drawing/2010/main" val="0"/>
@@ -7611,11 +7340,11 @@
                 <p:nvPr/>
               </p:nvPicPr>
               <p:blipFill>
-                <a:blip r:embed="rId9">
+                <a:blip r:embed="rId6">
                   <a:extLst>
                     <a:ext uri="{BEBA8EAE-BF5A-486C-A8C5-ECC9F3942E4B}">
                       <a14:imgProps xmlns:a14="http://schemas.microsoft.com/office/drawing/2010/main">
-                        <a14:imgLayer r:embed="rId10">
+                        <a14:imgLayer r:embed="rId7">
                           <a14:imgEffect>
                             <a14:saturation sat="0"/>
                           </a14:imgEffect>
@@ -7767,7 +7496,7 @@
                 <p:nvPr/>
               </p:nvPicPr>
               <p:blipFill>
-                <a:blip r:embed="rId11">
+                <a:blip r:embed="rId8">
                   <a:extLst>
                     <a:ext uri="{28A0092B-C50C-407E-A947-70E740481C1C}">
                       <a14:useLocalDpi xmlns:a14="http://schemas.microsoft.com/office/drawing/2010/main" val="0"/>
@@ -7849,7 +7578,7 @@
                 <p:nvPr/>
               </p:nvPicPr>
               <p:blipFill>
-                <a:blip r:embed="rId11">
+                <a:blip r:embed="rId8">
                   <a:extLst>
                     <a:ext uri="{28A0092B-C50C-407E-A947-70E740481C1C}">
                       <a14:useLocalDpi xmlns:a14="http://schemas.microsoft.com/office/drawing/2010/main" val="0"/>
@@ -7931,7 +7660,7 @@
                 <p:nvPr/>
               </p:nvPicPr>
               <p:blipFill>
-                <a:blip r:embed="rId12">
+                <a:blip r:embed="rId9">
                   <a:extLst>
                     <a:ext uri="{28A0092B-C50C-407E-A947-70E740481C1C}">
                       <a14:useLocalDpi xmlns:a14="http://schemas.microsoft.com/office/drawing/2010/main" val="0"/>
@@ -8006,11 +7735,11 @@
                 <p:nvPr/>
               </p:nvPicPr>
               <p:blipFill>
-                <a:blip r:embed="rId9">
+                <a:blip r:embed="rId6">
                   <a:extLst>
                     <a:ext uri="{BEBA8EAE-BF5A-486C-A8C5-ECC9F3942E4B}">
                       <a14:imgProps xmlns:a14="http://schemas.microsoft.com/office/drawing/2010/main">
-                        <a14:imgLayer r:embed="rId10">
+                        <a14:imgLayer r:embed="rId7">
                           <a14:imgEffect>
                             <a14:saturation sat="0"/>
                           </a14:imgEffect>
@@ -8324,7 +8053,7 @@
             <p:nvPr/>
           </p:nvPicPr>
           <p:blipFill>
-            <a:blip r:embed="rId13">
+            <a:blip r:embed="rId10">
               <a:extLst>
                 <a:ext uri="{28A0092B-C50C-407E-A947-70E740481C1C}">
                   <a14:useLocalDpi xmlns:a14="http://schemas.microsoft.com/office/drawing/2010/main" val="0"/>
@@ -8337,7 +8066,7 @@
           </p:blipFill>
           <p:spPr>
             <a:xfrm>
-              <a:off x="11359378" y="4843854"/>
+              <a:off x="11323750" y="4873544"/>
               <a:ext cx="569612" cy="569612"/>
             </a:xfrm>
             <a:prstGeom prst="rect">
@@ -8353,7 +8082,7 @@
           </p:nvSpPr>
           <p:spPr>
             <a:xfrm>
-              <a:off x="11061522" y="5356088"/>
+              <a:off x="11025894" y="5385778"/>
               <a:ext cx="1171865" cy="307777"/>
             </a:xfrm>
             <a:prstGeom prst="rect">
@@ -8389,6 +8118,344 @@
                   </a:solidFill>
                 </a:rPr>
                 <a:t> Cache</a:t>
+              </a:r>
+            </a:p>
+          </p:txBody>
+        </p:sp>
+      </p:grpSp>
+      <p:grpSp>
+        <p:nvGrpSpPr>
+          <p:cNvPr id="13" name="Group 12"/>
+          <p:cNvGrpSpPr/>
+          <p:nvPr/>
+        </p:nvGrpSpPr>
+        <p:grpSpPr>
+          <a:xfrm>
+            <a:off x="3424881" y="5741237"/>
+            <a:ext cx="5324447" cy="1054434"/>
+            <a:chOff x="4085543" y="5769028"/>
+            <a:chExt cx="5324447" cy="1054434"/>
+          </a:xfrm>
+        </p:grpSpPr>
+        <p:sp>
+          <p:nvSpPr>
+            <p:cNvPr id="15" name="Rectangle 14"/>
+            <p:cNvSpPr/>
+            <p:nvPr/>
+          </p:nvSpPr>
+          <p:spPr>
+            <a:xfrm>
+              <a:off x="4085543" y="5769028"/>
+              <a:ext cx="5324447" cy="1054434"/>
+            </a:xfrm>
+            <a:prstGeom prst="rect">
+              <a:avLst/>
+            </a:prstGeom>
+            <a:solidFill>
+              <a:schemeClr val="accent6">
+                <a:lumMod val="40000"/>
+                <a:lumOff val="60000"/>
+                <a:alpha val="43000"/>
+              </a:schemeClr>
+            </a:solidFill>
+            <a:ln>
+              <a:solidFill>
+                <a:schemeClr val="accent6">
+                  <a:lumMod val="60000"/>
+                  <a:lumOff val="40000"/>
+                </a:schemeClr>
+              </a:solidFill>
+            </a:ln>
+          </p:spPr>
+          <p:style>
+            <a:lnRef idx="2">
+              <a:schemeClr val="accent1">
+                <a:shade val="50000"/>
+              </a:schemeClr>
+            </a:lnRef>
+            <a:fillRef idx="1">
+              <a:schemeClr val="accent1"/>
+            </a:fillRef>
+            <a:effectRef idx="0">
+              <a:schemeClr val="accent1"/>
+            </a:effectRef>
+            <a:fontRef idx="minor">
+              <a:schemeClr val="lt1"/>
+            </a:fontRef>
+          </p:style>
+          <p:txBody>
+            <a:bodyPr rtlCol="0" anchor="ctr"/>
+            <a:lstStyle/>
+            <a:p>
+              <a:pPr algn="ctr"/>
+              <a:endParaRPr lang="en-US"/>
+            </a:p>
+          </p:txBody>
+        </p:sp>
+        <p:pic>
+          <p:nvPicPr>
+            <p:cNvPr id="99" name="Picture 98"/>
+            <p:cNvPicPr>
+              <a:picLocks noChangeAspect="1"/>
+            </p:cNvPicPr>
+            <p:nvPr/>
+          </p:nvPicPr>
+          <p:blipFill>
+            <a:blip r:embed="rId11">
+              <a:extLst>
+                <a:ext uri="{28A0092B-C50C-407E-A947-70E740481C1C}">
+                  <a14:useLocalDpi xmlns:a14="http://schemas.microsoft.com/office/drawing/2010/main" val="0"/>
+                </a:ext>
+              </a:extLst>
+            </a:blip>
+            <a:stretch>
+              <a:fillRect/>
+            </a:stretch>
+          </p:blipFill>
+          <p:spPr>
+            <a:xfrm>
+              <a:off x="7262776" y="5984996"/>
+              <a:ext cx="569612" cy="569612"/>
+            </a:xfrm>
+            <a:prstGeom prst="rect">
+              <a:avLst/>
+            </a:prstGeom>
+          </p:spPr>
+        </p:pic>
+        <p:sp>
+          <p:nvSpPr>
+            <p:cNvPr id="102" name="TextBox 101"/>
+            <p:cNvSpPr txBox="1"/>
+            <p:nvPr/>
+          </p:nvSpPr>
+          <p:spPr>
+            <a:xfrm>
+              <a:off x="6983808" y="6496222"/>
+              <a:ext cx="1082556" cy="307777"/>
+            </a:xfrm>
+            <a:prstGeom prst="rect">
+              <a:avLst/>
+            </a:prstGeom>
+            <a:noFill/>
+          </p:spPr>
+          <p:txBody>
+            <a:bodyPr wrap="square" rtlCol="0">
+              <a:spAutoFit/>
+            </a:bodyPr>
+            <a:lstStyle/>
+            <a:p>
+              <a:pPr algn="ctr"/>
+              <a:r>
+                <a:rPr lang="en-US" sz="1400" dirty="0">
+                  <a:solidFill>
+                    <a:schemeClr val="tx1">
+                      <a:lumMod val="65000"/>
+                      <a:lumOff val="35000"/>
+                    </a:schemeClr>
+                  </a:solidFill>
+                </a:rPr>
+                <a:t>App Insights</a:t>
+              </a:r>
+            </a:p>
+          </p:txBody>
+        </p:sp>
+        <p:pic>
+          <p:nvPicPr>
+            <p:cNvPr id="131" name="Picture 130"/>
+            <p:cNvPicPr>
+              <a:picLocks noChangeAspect="1"/>
+            </p:cNvPicPr>
+            <p:nvPr/>
+          </p:nvPicPr>
+          <p:blipFill>
+            <a:blip r:embed="rId12">
+              <a:extLst>
+                <a:ext uri="{28A0092B-C50C-407E-A947-70E740481C1C}">
+                  <a14:useLocalDpi xmlns:a14="http://schemas.microsoft.com/office/drawing/2010/main" val="0"/>
+                </a:ext>
+              </a:extLst>
+            </a:blip>
+            <a:stretch>
+              <a:fillRect/>
+            </a:stretch>
+          </p:blipFill>
+          <p:spPr>
+            <a:xfrm>
+              <a:off x="4374478" y="5984996"/>
+              <a:ext cx="569612" cy="569612"/>
+            </a:xfrm>
+            <a:prstGeom prst="rect">
+              <a:avLst/>
+            </a:prstGeom>
+          </p:spPr>
+        </p:pic>
+        <p:sp>
+          <p:nvSpPr>
+            <p:cNvPr id="132" name="TextBox 131"/>
+            <p:cNvSpPr txBox="1"/>
+            <p:nvPr/>
+          </p:nvSpPr>
+          <p:spPr>
+            <a:xfrm>
+              <a:off x="4086661" y="6496224"/>
+              <a:ext cx="1212553" cy="307777"/>
+            </a:xfrm>
+            <a:prstGeom prst="rect">
+              <a:avLst/>
+            </a:prstGeom>
+            <a:noFill/>
+          </p:spPr>
+          <p:txBody>
+            <a:bodyPr wrap="square" rtlCol="0">
+              <a:spAutoFit/>
+            </a:bodyPr>
+            <a:lstStyle/>
+            <a:p>
+              <a:pPr algn="ctr"/>
+              <a:r>
+                <a:rPr lang="en-US" sz="1400" dirty="0">
+                  <a:solidFill>
+                    <a:schemeClr val="tx1">
+                      <a:lumMod val="65000"/>
+                      <a:lumOff val="35000"/>
+                    </a:schemeClr>
+                  </a:solidFill>
+                </a:rPr>
+                <a:t>Document DB</a:t>
+              </a:r>
+            </a:p>
+          </p:txBody>
+        </p:sp>
+        <p:pic>
+          <p:nvPicPr>
+            <p:cNvPr id="108" name="Picture 107"/>
+            <p:cNvPicPr>
+              <a:picLocks noChangeAspect="1"/>
+            </p:cNvPicPr>
+            <p:nvPr/>
+          </p:nvPicPr>
+          <p:blipFill>
+            <a:blip r:embed="rId13">
+              <a:extLst>
+                <a:ext uri="{28A0092B-C50C-407E-A947-70E740481C1C}">
+                  <a14:useLocalDpi xmlns:a14="http://schemas.microsoft.com/office/drawing/2010/main" val="0"/>
+                </a:ext>
+              </a:extLst>
+            </a:blip>
+            <a:stretch>
+              <a:fillRect/>
+            </a:stretch>
+          </p:blipFill>
+          <p:spPr>
+            <a:xfrm>
+              <a:off x="5818627" y="5984996"/>
+              <a:ext cx="569612" cy="569612"/>
+            </a:xfrm>
+            <a:prstGeom prst="rect">
+              <a:avLst/>
+            </a:prstGeom>
+          </p:spPr>
+        </p:pic>
+        <p:sp>
+          <p:nvSpPr>
+            <p:cNvPr id="112" name="TextBox 111"/>
+            <p:cNvSpPr txBox="1"/>
+            <p:nvPr/>
+          </p:nvSpPr>
+          <p:spPr>
+            <a:xfrm>
+              <a:off x="5553763" y="6496223"/>
+              <a:ext cx="1099339" cy="307777"/>
+            </a:xfrm>
+            <a:prstGeom prst="rect">
+              <a:avLst/>
+            </a:prstGeom>
+            <a:noFill/>
+          </p:spPr>
+          <p:txBody>
+            <a:bodyPr wrap="square" rtlCol="0">
+              <a:spAutoFit/>
+            </a:bodyPr>
+            <a:lstStyle/>
+            <a:p>
+              <a:pPr algn="ctr"/>
+              <a:r>
+                <a:rPr lang="en-US" sz="1400" dirty="0">
+                  <a:solidFill>
+                    <a:schemeClr val="tx1">
+                      <a:lumMod val="65000"/>
+                      <a:lumOff val="35000"/>
+                    </a:schemeClr>
+                  </a:solidFill>
+                </a:rPr>
+                <a:t>App Storage</a:t>
+              </a:r>
+            </a:p>
+          </p:txBody>
+        </p:sp>
+        <p:pic>
+          <p:nvPicPr>
+            <p:cNvPr id="10" name="Picture 9"/>
+            <p:cNvPicPr>
+              <a:picLocks noChangeAspect="1"/>
+            </p:cNvPicPr>
+            <p:nvPr/>
+          </p:nvPicPr>
+          <p:blipFill>
+            <a:blip r:embed="rId14">
+              <a:extLst>
+                <a:ext uri="{28A0092B-C50C-407E-A947-70E740481C1C}">
+                  <a14:useLocalDpi xmlns:a14="http://schemas.microsoft.com/office/drawing/2010/main" val="0"/>
+                </a:ext>
+              </a:extLst>
+            </a:blip>
+            <a:stretch>
+              <a:fillRect/>
+            </a:stretch>
+          </p:blipFill>
+          <p:spPr>
+            <a:xfrm>
+              <a:off x="8706925" y="5984996"/>
+              <a:ext cx="569612" cy="569612"/>
+            </a:xfrm>
+            <a:prstGeom prst="rect">
+              <a:avLst/>
+            </a:prstGeom>
+          </p:spPr>
+        </p:pic>
+        <p:sp>
+          <p:nvSpPr>
+            <p:cNvPr id="113" name="TextBox 112"/>
+            <p:cNvSpPr txBox="1"/>
+            <p:nvPr/>
+          </p:nvSpPr>
+          <p:spPr>
+            <a:xfrm>
+              <a:off x="8724694" y="6502579"/>
+              <a:ext cx="600223" cy="307777"/>
+            </a:xfrm>
+            <a:prstGeom prst="rect">
+              <a:avLst/>
+            </a:prstGeom>
+            <a:noFill/>
+          </p:spPr>
+          <p:txBody>
+            <a:bodyPr wrap="square" rtlCol="0">
+              <a:spAutoFit/>
+            </a:bodyPr>
+            <a:lstStyle/>
+            <a:p>
+              <a:pPr algn="ctr"/>
+              <a:r>
+                <a:rPr lang="en-US" sz="1400" dirty="0">
+                  <a:solidFill>
+                    <a:schemeClr val="tx1">
+                      <a:lumMod val="65000"/>
+                      <a:lumOff val="35000"/>
+                    </a:schemeClr>
+                  </a:solidFill>
+                </a:rPr>
+                <a:t>CDN</a:t>
               </a:r>
             </a:p>
           </p:txBody>

</xml_diff>

<commit_message>
Moved DocumentDB and Storage to the HA/Common resource group deployment.  Updated reference architectures.  Removed UploadArtifacts switch in PowerShell script.  Updated README to reflect setup changes.
</commit_message>
<xml_diff>
--- a/setup/AzureX.pptx
+++ b/setup/AzureX.pptx
@@ -5079,86 +5079,6 @@
       </p:grpSp>
       <p:cxnSp>
         <p:nvCxnSpPr>
-          <p:cNvPr id="163" name="Connector: Elbow 162"/>
-          <p:cNvCxnSpPr>
-            <a:cxnSpLocks/>
-            <a:stCxn id="94" idx="3"/>
-            <a:endCxn id="60" idx="1"/>
-          </p:cNvCxnSpPr>
-          <p:nvPr/>
-        </p:nvCxnSpPr>
-        <p:spPr>
-          <a:xfrm>
-            <a:off x="6389365" y="1776861"/>
-            <a:ext cx="646393" cy="808791"/>
-          </a:xfrm>
-          <a:prstGeom prst="bentConnector3">
-            <a:avLst>
-              <a:gd name="adj1" fmla="val 35759"/>
-            </a:avLst>
-          </a:prstGeom>
-          <a:ln w="15875">
-            <a:headEnd type="triangle"/>
-            <a:tailEnd type="triangle"/>
-          </a:ln>
-        </p:spPr>
-        <p:style>
-          <a:lnRef idx="1">
-            <a:schemeClr val="accent1"/>
-          </a:lnRef>
-          <a:fillRef idx="0">
-            <a:schemeClr val="accent1"/>
-          </a:fillRef>
-          <a:effectRef idx="0">
-            <a:schemeClr val="accent1"/>
-          </a:effectRef>
-          <a:fontRef idx="minor">
-            <a:schemeClr val="tx1"/>
-          </a:fontRef>
-        </p:style>
-      </p:cxnSp>
-      <p:cxnSp>
-        <p:nvCxnSpPr>
-          <p:cNvPr id="166" name="Connector: Elbow 165"/>
-          <p:cNvCxnSpPr>
-            <a:cxnSpLocks/>
-            <a:stCxn id="94" idx="1"/>
-            <a:endCxn id="139" idx="3"/>
-          </p:cNvCxnSpPr>
-          <p:nvPr/>
-        </p:nvCxnSpPr>
-        <p:spPr>
-          <a:xfrm rot="10800000" flipV="1">
-            <a:off x="5185459" y="1776860"/>
-            <a:ext cx="634295" cy="808791"/>
-          </a:xfrm>
-          <a:prstGeom prst="bentConnector3">
-            <a:avLst>
-              <a:gd name="adj1" fmla="val 35487"/>
-            </a:avLst>
-          </a:prstGeom>
-          <a:ln w="15875">
-            <a:headEnd type="triangle"/>
-            <a:tailEnd type="triangle"/>
-          </a:ln>
-        </p:spPr>
-        <p:style>
-          <a:lnRef idx="1">
-            <a:schemeClr val="accent1"/>
-          </a:lnRef>
-          <a:fillRef idx="0">
-            <a:schemeClr val="accent1"/>
-          </a:fillRef>
-          <a:effectRef idx="0">
-            <a:schemeClr val="accent1"/>
-          </a:effectRef>
-          <a:fontRef idx="minor">
-            <a:schemeClr val="tx1"/>
-          </a:fontRef>
-        </p:style>
-      </p:cxnSp>
-      <p:cxnSp>
-        <p:nvCxnSpPr>
           <p:cNvPr id="169" name="Straight Arrow Connector 168"/>
           <p:cNvCxnSpPr>
             <a:cxnSpLocks/>
@@ -5194,121 +5114,6 @@
           </a:fontRef>
         </p:style>
       </p:cxnSp>
-      <p:cxnSp>
-        <p:nvCxnSpPr>
-          <p:cNvPr id="174" name="Connector: Elbow 173"/>
-          <p:cNvCxnSpPr>
-            <a:cxnSpLocks/>
-            <a:stCxn id="156" idx="3"/>
-            <a:endCxn id="64" idx="1"/>
-          </p:cNvCxnSpPr>
-          <p:nvPr/>
-        </p:nvCxnSpPr>
-        <p:spPr>
-          <a:xfrm>
-            <a:off x="6392983" y="3528932"/>
-            <a:ext cx="1786733" cy="624794"/>
-          </a:xfrm>
-          <a:prstGeom prst="bentConnector3">
-            <a:avLst>
-              <a:gd name="adj1" fmla="val 50000"/>
-            </a:avLst>
-          </a:prstGeom>
-          <a:ln w="15875">
-            <a:headEnd type="triangle"/>
-            <a:tailEnd type="triangle"/>
-          </a:ln>
-        </p:spPr>
-        <p:style>
-          <a:lnRef idx="1">
-            <a:schemeClr val="accent1"/>
-          </a:lnRef>
-          <a:fillRef idx="0">
-            <a:schemeClr val="accent1"/>
-          </a:fillRef>
-          <a:effectRef idx="0">
-            <a:schemeClr val="accent1"/>
-          </a:effectRef>
-          <a:fontRef idx="minor">
-            <a:schemeClr val="tx1"/>
-          </a:fontRef>
-        </p:style>
-      </p:cxnSp>
-      <p:cxnSp>
-        <p:nvCxnSpPr>
-          <p:cNvPr id="177" name="Connector: Elbow 176"/>
-          <p:cNvCxnSpPr>
-            <a:cxnSpLocks/>
-            <a:stCxn id="156" idx="1"/>
-            <a:endCxn id="133" idx="3"/>
-          </p:cNvCxnSpPr>
-          <p:nvPr/>
-        </p:nvCxnSpPr>
-        <p:spPr>
-          <a:xfrm rot="10800000" flipV="1">
-            <a:off x="3823391" y="3528932"/>
-            <a:ext cx="1999980" cy="624794"/>
-          </a:xfrm>
-          <a:prstGeom prst="bentConnector3">
-            <a:avLst>
-              <a:gd name="adj1" fmla="val 50000"/>
-            </a:avLst>
-          </a:prstGeom>
-          <a:ln w="15875">
-            <a:headEnd type="triangle"/>
-            <a:tailEnd type="triangle"/>
-          </a:ln>
-        </p:spPr>
-        <p:style>
-          <a:lnRef idx="1">
-            <a:schemeClr val="accent1"/>
-          </a:lnRef>
-          <a:fillRef idx="0">
-            <a:schemeClr val="accent1"/>
-          </a:fillRef>
-          <a:effectRef idx="0">
-            <a:schemeClr val="accent1"/>
-          </a:effectRef>
-          <a:fontRef idx="minor">
-            <a:schemeClr val="tx1"/>
-          </a:fontRef>
-        </p:style>
-      </p:cxnSp>
-      <p:sp>
-        <p:nvSpPr>
-          <p:cNvPr id="114" name="TextBox 113"/>
-          <p:cNvSpPr txBox="1"/>
-          <p:nvPr/>
-        </p:nvSpPr>
-        <p:spPr>
-          <a:xfrm>
-            <a:off x="4053989" y="5716673"/>
-            <a:ext cx="1344799" cy="307777"/>
-          </a:xfrm>
-          <a:prstGeom prst="rect">
-            <a:avLst/>
-          </a:prstGeom>
-          <a:noFill/>
-        </p:spPr>
-        <p:txBody>
-          <a:bodyPr wrap="square" rtlCol="0">
-            <a:spAutoFit/>
-          </a:bodyPr>
-          <a:lstStyle/>
-          <a:p>
-            <a:r>
-              <a:rPr lang="en-US" sz="1400" dirty="0">
-                <a:solidFill>
-                  <a:schemeClr val="accent6">
-                    <a:lumMod val="75000"/>
-                  </a:schemeClr>
-                </a:solidFill>
-              </a:rPr>
-              <a:t>Resource Group</a:t>
-            </a:r>
-          </a:p>
-        </p:txBody>
-      </p:sp>
       <p:cxnSp>
         <p:nvCxnSpPr>
           <p:cNvPr id="162" name="Connector: Elbow 161"/>
@@ -8125,16 +7930,16 @@
       </p:grpSp>
       <p:grpSp>
         <p:nvGrpSpPr>
-          <p:cNvPr id="13" name="Group 12"/>
+          <p:cNvPr id="2" name="Group 1"/>
           <p:cNvGrpSpPr/>
           <p:nvPr/>
         </p:nvGrpSpPr>
         <p:grpSpPr>
           <a:xfrm>
-            <a:off x="3424881" y="5741237"/>
-            <a:ext cx="5324447" cy="1054434"/>
-            <a:chOff x="4085543" y="5769028"/>
-            <a:chExt cx="5324447" cy="1054434"/>
+            <a:off x="3366841" y="5670658"/>
+            <a:ext cx="5382487" cy="1125013"/>
+            <a:chOff x="3366841" y="5670658"/>
+            <a:chExt cx="5382487" cy="1125013"/>
           </a:xfrm>
         </p:grpSpPr>
         <p:sp>
@@ -8145,7 +7950,7 @@
           </p:nvSpPr>
           <p:spPr>
             <a:xfrm>
-              <a:off x="4085543" y="5769028"/>
+              <a:off x="3424881" y="5741237"/>
               <a:ext cx="5324447" cy="1054434"/>
             </a:xfrm>
             <a:prstGeom prst="rect">
@@ -8192,6 +7997,41 @@
             </a:p>
           </p:txBody>
         </p:sp>
+        <p:sp>
+          <p:nvSpPr>
+            <p:cNvPr id="114" name="TextBox 113"/>
+            <p:cNvSpPr txBox="1"/>
+            <p:nvPr/>
+          </p:nvSpPr>
+          <p:spPr>
+            <a:xfrm>
+              <a:off x="3366841" y="5670658"/>
+              <a:ext cx="1344799" cy="307777"/>
+            </a:xfrm>
+            <a:prstGeom prst="rect">
+              <a:avLst/>
+            </a:prstGeom>
+            <a:noFill/>
+          </p:spPr>
+          <p:txBody>
+            <a:bodyPr wrap="square" rtlCol="0">
+              <a:spAutoFit/>
+            </a:bodyPr>
+            <a:lstStyle/>
+            <a:p>
+              <a:r>
+                <a:rPr lang="en-US" sz="1400" dirty="0">
+                  <a:solidFill>
+                    <a:schemeClr val="accent6">
+                      <a:lumMod val="75000"/>
+                    </a:schemeClr>
+                  </a:solidFill>
+                </a:rPr>
+                <a:t>Resource Group</a:t>
+              </a:r>
+            </a:p>
+          </p:txBody>
+        </p:sp>
         <p:pic>
           <p:nvPicPr>
             <p:cNvPr id="99" name="Picture 98"/>
@@ -8214,7 +8054,7 @@
           </p:blipFill>
           <p:spPr>
             <a:xfrm>
-              <a:off x="7262776" y="5984996"/>
+              <a:off x="6602114" y="5957205"/>
               <a:ext cx="569612" cy="569612"/>
             </a:xfrm>
             <a:prstGeom prst="rect">
@@ -8230,7 +8070,7 @@
           </p:nvSpPr>
           <p:spPr>
             <a:xfrm>
-              <a:off x="6983808" y="6496222"/>
+              <a:off x="6323146" y="6468431"/>
               <a:ext cx="1082556" cy="307777"/>
             </a:xfrm>
             <a:prstGeom prst="rect">
@@ -8281,7 +8121,7 @@
           </p:blipFill>
           <p:spPr>
             <a:xfrm>
-              <a:off x="4374478" y="5984996"/>
+              <a:off x="3713816" y="5957205"/>
               <a:ext cx="569612" cy="569612"/>
             </a:xfrm>
             <a:prstGeom prst="rect">
@@ -8297,7 +8137,7 @@
           </p:nvSpPr>
           <p:spPr>
             <a:xfrm>
-              <a:off x="4086661" y="6496224"/>
+              <a:off x="3425999" y="6468433"/>
               <a:ext cx="1212553" cy="307777"/>
             </a:xfrm>
             <a:prstGeom prst="rect">
@@ -8348,7 +8188,7 @@
           </p:blipFill>
           <p:spPr>
             <a:xfrm>
-              <a:off x="5818627" y="5984996"/>
+              <a:off x="5157965" y="5957205"/>
               <a:ext cx="569612" cy="569612"/>
             </a:xfrm>
             <a:prstGeom prst="rect">
@@ -8364,7 +8204,7 @@
           </p:nvSpPr>
           <p:spPr>
             <a:xfrm>
-              <a:off x="5553763" y="6496223"/>
+              <a:off x="4893101" y="6468432"/>
               <a:ext cx="1099339" cy="307777"/>
             </a:xfrm>
             <a:prstGeom prst="rect">
@@ -8415,7 +8255,7 @@
           </p:blipFill>
           <p:spPr>
             <a:xfrm>
-              <a:off x="8706925" y="5984996"/>
+              <a:off x="8046263" y="5957205"/>
               <a:ext cx="569612" cy="569612"/>
             </a:xfrm>
             <a:prstGeom prst="rect">
@@ -8431,7 +8271,7 @@
           </p:nvSpPr>
           <p:spPr>
             <a:xfrm>
-              <a:off x="8724694" y="6502579"/>
+              <a:off x="8064032" y="6474788"/>
               <a:ext cx="600223" cy="307777"/>
             </a:xfrm>
             <a:prstGeom prst="rect">
@@ -8461,6 +8301,166 @@
           </p:txBody>
         </p:sp>
       </p:grpSp>
+      <p:cxnSp>
+        <p:nvCxnSpPr>
+          <p:cNvPr id="166" name="Connector: Elbow 165"/>
+          <p:cNvCxnSpPr>
+            <a:cxnSpLocks/>
+            <a:stCxn id="94" idx="1"/>
+            <a:endCxn id="139" idx="3"/>
+          </p:cNvCxnSpPr>
+          <p:nvPr/>
+        </p:nvCxnSpPr>
+        <p:spPr>
+          <a:xfrm rot="10800000" flipV="1">
+            <a:off x="5185459" y="1776860"/>
+            <a:ext cx="634295" cy="808791"/>
+          </a:xfrm>
+          <a:prstGeom prst="bentConnector3">
+            <a:avLst>
+              <a:gd name="adj1" fmla="val 35487"/>
+            </a:avLst>
+          </a:prstGeom>
+          <a:ln w="15875">
+            <a:headEnd type="triangle"/>
+            <a:tailEnd type="triangle"/>
+          </a:ln>
+        </p:spPr>
+        <p:style>
+          <a:lnRef idx="1">
+            <a:schemeClr val="accent1"/>
+          </a:lnRef>
+          <a:fillRef idx="0">
+            <a:schemeClr val="accent1"/>
+          </a:fillRef>
+          <a:effectRef idx="0">
+            <a:schemeClr val="accent1"/>
+          </a:effectRef>
+          <a:fontRef idx="minor">
+            <a:schemeClr val="tx1"/>
+          </a:fontRef>
+        </p:style>
+      </p:cxnSp>
+      <p:cxnSp>
+        <p:nvCxnSpPr>
+          <p:cNvPr id="163" name="Connector: Elbow 162"/>
+          <p:cNvCxnSpPr>
+            <a:cxnSpLocks/>
+            <a:stCxn id="94" idx="3"/>
+            <a:endCxn id="60" idx="1"/>
+          </p:cNvCxnSpPr>
+          <p:nvPr/>
+        </p:nvCxnSpPr>
+        <p:spPr>
+          <a:xfrm>
+            <a:off x="6389365" y="1776861"/>
+            <a:ext cx="646393" cy="808791"/>
+          </a:xfrm>
+          <a:prstGeom prst="bentConnector3">
+            <a:avLst>
+              <a:gd name="adj1" fmla="val 35759"/>
+            </a:avLst>
+          </a:prstGeom>
+          <a:ln w="15875">
+            <a:headEnd type="triangle"/>
+            <a:tailEnd type="triangle"/>
+          </a:ln>
+        </p:spPr>
+        <p:style>
+          <a:lnRef idx="1">
+            <a:schemeClr val="accent1"/>
+          </a:lnRef>
+          <a:fillRef idx="0">
+            <a:schemeClr val="accent1"/>
+          </a:fillRef>
+          <a:effectRef idx="0">
+            <a:schemeClr val="accent1"/>
+          </a:effectRef>
+          <a:fontRef idx="minor">
+            <a:schemeClr val="tx1"/>
+          </a:fontRef>
+        </p:style>
+      </p:cxnSp>
+      <p:cxnSp>
+        <p:nvCxnSpPr>
+          <p:cNvPr id="174" name="Connector: Elbow 173"/>
+          <p:cNvCxnSpPr>
+            <a:cxnSpLocks/>
+            <a:stCxn id="156" idx="3"/>
+            <a:endCxn id="64" idx="1"/>
+          </p:cNvCxnSpPr>
+          <p:nvPr/>
+        </p:nvCxnSpPr>
+        <p:spPr>
+          <a:xfrm>
+            <a:off x="6392983" y="3528932"/>
+            <a:ext cx="1786733" cy="624794"/>
+          </a:xfrm>
+          <a:prstGeom prst="bentConnector3">
+            <a:avLst>
+              <a:gd name="adj1" fmla="val 50000"/>
+            </a:avLst>
+          </a:prstGeom>
+          <a:ln w="15875">
+            <a:headEnd type="triangle"/>
+            <a:tailEnd type="triangle"/>
+          </a:ln>
+        </p:spPr>
+        <p:style>
+          <a:lnRef idx="1">
+            <a:schemeClr val="accent1"/>
+          </a:lnRef>
+          <a:fillRef idx="0">
+            <a:schemeClr val="accent1"/>
+          </a:fillRef>
+          <a:effectRef idx="0">
+            <a:schemeClr val="accent1"/>
+          </a:effectRef>
+          <a:fontRef idx="minor">
+            <a:schemeClr val="tx1"/>
+          </a:fontRef>
+        </p:style>
+      </p:cxnSp>
+      <p:cxnSp>
+        <p:nvCxnSpPr>
+          <p:cNvPr id="177" name="Connector: Elbow 176"/>
+          <p:cNvCxnSpPr>
+            <a:cxnSpLocks/>
+            <a:stCxn id="156" idx="1"/>
+            <a:endCxn id="133" idx="3"/>
+          </p:cNvCxnSpPr>
+          <p:nvPr/>
+        </p:nvCxnSpPr>
+        <p:spPr>
+          <a:xfrm rot="10800000" flipV="1">
+            <a:off x="3823391" y="3528932"/>
+            <a:ext cx="1999980" cy="624794"/>
+          </a:xfrm>
+          <a:prstGeom prst="bentConnector3">
+            <a:avLst>
+              <a:gd name="adj1" fmla="val 50000"/>
+            </a:avLst>
+          </a:prstGeom>
+          <a:ln w="15875">
+            <a:headEnd type="triangle"/>
+            <a:tailEnd type="triangle"/>
+          </a:ln>
+        </p:spPr>
+        <p:style>
+          <a:lnRef idx="1">
+            <a:schemeClr val="accent1"/>
+          </a:lnRef>
+          <a:fillRef idx="0">
+            <a:schemeClr val="accent1"/>
+          </a:fillRef>
+          <a:effectRef idx="0">
+            <a:schemeClr val="accent1"/>
+          </a:effectRef>
+          <a:fontRef idx="minor">
+            <a:schemeClr val="tx1"/>
+          </a:fontRef>
+        </p:style>
+      </p:cxnSp>
     </p:spTree>
     <p:extLst>
       <p:ext uri="{BB962C8B-B14F-4D97-AF65-F5344CB8AC3E}">

</xml_diff>